<commit_message>
Updated 2 color line follower pptx and pdf
</commit_message>
<xml_diff>
--- a/translations/en-us/advanced/ProportionalTwoColorLineFollower.pptx
+++ b/translations/en-us/advanced/ProportionalTwoColorLineFollower.pptx
@@ -8863,15 +8863,7 @@
                   <a:schemeClr val="tx1"/>
                 </a:solidFill>
               </a:rPr>
-              <a:t>By Droids </a:t>
-            </a:r>
-            <a:r>
-              <a:rPr lang="en-US" dirty="0" smtClean="0">
-                <a:solidFill>
-                  <a:schemeClr val="tx1"/>
-                </a:solidFill>
-              </a:rPr>
-              <a:t>Robotics </a:t>
+              <a:t>By Droids Robotics </a:t>
             </a:r>
             <a:endParaRPr lang="en-US" dirty="0">
               <a:solidFill>
@@ -8888,11 +8880,6 @@
               </a:rPr>
               <a:t>Code Contributed by FLL 1920</a:t>
             </a:r>
-            <a:endParaRPr lang="en-US" dirty="0" smtClean="0">
-              <a:solidFill>
-                <a:schemeClr val="tx1"/>
-              </a:solidFill>
-            </a:endParaRPr>
           </a:p>
         </p:txBody>
       </p:sp>
@@ -9167,28 +9154,22 @@
       </p:sp>
       <p:pic>
         <p:nvPicPr>
-          <p:cNvPr id="6" name="Picture 5" descr="Screen Shot 2015-09-07 at 5.26.55 PM.png"/>
+          <p:cNvPr id="3" name="Picture 2"/>
           <p:cNvPicPr>
             <a:picLocks noChangeAspect="1"/>
           </p:cNvPicPr>
           <p:nvPr/>
         </p:nvPicPr>
         <p:blipFill>
-          <a:blip r:embed="rId2">
-            <a:extLst>
-              <a:ext uri="{28A0092B-C50C-407E-A947-70E740481C1C}">
-                <a14:useLocalDpi xmlns:a14="http://schemas.microsoft.com/office/drawing/2010/main" val="0"/>
-              </a:ext>
-            </a:extLst>
-          </a:blip>
+          <a:blip r:embed="rId2"/>
           <a:stretch>
             <a:fillRect/>
           </a:stretch>
         </p:blipFill>
         <p:spPr>
           <a:xfrm>
-            <a:off x="179607" y="2087342"/>
-            <a:ext cx="8847276" cy="3283525"/>
+            <a:off x="109893" y="1870858"/>
+            <a:ext cx="8827187" cy="3754915"/>
           </a:xfrm>
           <a:prstGeom prst="rect">
             <a:avLst/>
@@ -9272,6 +9253,23 @@
               <a:rPr lang="en-US" dirty="0" smtClean="0"/>
               <a:t>EV3Lessons.com YouTube Channel</a:t>
             </a:r>
+          </a:p>
+          <a:p>
+            <a:endParaRPr lang="en-US" dirty="0"/>
+          </a:p>
+          <a:p>
+            <a:r>
+              <a:rPr lang="en-US" dirty="0"/>
+              <a:t>https://</a:t>
+            </a:r>
+            <a:r>
+              <a:rPr lang="en-US" dirty="0" err="1"/>
+              <a:t>youtu.be</a:t>
+            </a:r>
+            <a:r>
+              <a:rPr lang="en-US"/>
+              <a:t>/qHwho1k1GZ4</a:t>
+            </a:r>
             <a:endParaRPr lang="en-US" dirty="0"/>
           </a:p>
         </p:txBody>
@@ -9397,7 +9395,42 @@
           <a:p>
             <a:r>
               <a:rPr lang="en-US" dirty="0" smtClean="0"/>
-              <a:t>This lesson was written by Droids Robotics using code, video and photos by FLL Team 1920.</a:t>
+              <a:t>This lesson was written </a:t>
+            </a:r>
+            <a:r>
+              <a:rPr lang="en-US" dirty="0" smtClean="0"/>
+              <a:t>by Sanjay and </a:t>
+            </a:r>
+            <a:r>
+              <a:rPr lang="en-US" dirty="0" err="1" smtClean="0"/>
+              <a:t>Arvind</a:t>
+            </a:r>
+            <a:r>
+              <a:rPr lang="en-US" dirty="0" smtClean="0"/>
+              <a:t> Seshan from </a:t>
+            </a:r>
+            <a:r>
+              <a:rPr lang="en-US" dirty="0" smtClean="0"/>
+              <a:t>Droids Robotics </a:t>
+            </a:r>
+            <a:endParaRPr lang="en-US" dirty="0" smtClean="0"/>
+          </a:p>
+          <a:p>
+            <a:r>
+              <a:rPr lang="en-US" dirty="0" smtClean="0"/>
+              <a:t>FLL Team 1920, Baker’s Dozen contributed </a:t>
+            </a:r>
+            <a:r>
+              <a:rPr lang="en-US" dirty="0" smtClean="0"/>
+              <a:t>code</a:t>
+            </a:r>
+            <a:r>
+              <a:rPr lang="en-US" dirty="0" smtClean="0"/>
+              <a:t>, video and photos </a:t>
+            </a:r>
+            <a:r>
+              <a:rPr lang="en-US" dirty="0" smtClean="0"/>
+              <a:t>for making the basic two color line follower (line straddle)</a:t>
             </a:r>
             <a:endParaRPr lang="en-US" dirty="0" smtClean="0"/>
           </a:p>
@@ -10992,11 +11025,7 @@
           <a:p>
             <a:r>
               <a:rPr lang="en-US" dirty="0" smtClean="0"/>
-              <a:t>What is a T</a:t>
-            </a:r>
-            <a:r>
-              <a:rPr lang="en-US" dirty="0" smtClean="0"/>
-              <a:t>wo Color Line Follower?</a:t>
+              <a:t>What is a Two Color Line Follower?</a:t>
             </a:r>
             <a:endParaRPr lang="en-US" dirty="0"/>
           </a:p>
@@ -11074,15 +11103,7 @@
           <a:p>
             <a:r>
               <a:rPr lang="en-US" sz="2000" dirty="0" smtClean="0"/>
-              <a:t>The goal is to use two </a:t>
-            </a:r>
-            <a:r>
-              <a:rPr lang="en-US" sz="2000" dirty="0" smtClean="0"/>
-              <a:t>light sensors next to each other to follow a </a:t>
-            </a:r>
-            <a:r>
-              <a:rPr lang="en-US" sz="2000" dirty="0" smtClean="0"/>
-              <a:t>line</a:t>
+              <a:t>The goal is to use two light sensors next to each other to follow a line</a:t>
             </a:r>
           </a:p>
           <a:p>
@@ -11102,7 +11123,6 @@
               <a:rPr lang="en-US" sz="2000" dirty="0" smtClean="0"/>
               <a:t>When following the line they should both sensors should be reading the edge of the line</a:t>
             </a:r>
-            <a:endParaRPr lang="en-US" sz="2000" dirty="0" smtClean="0"/>
           </a:p>
         </p:txBody>
       </p:sp>
@@ -11309,11 +11329,7 @@
           <a:p>
             <a:r>
               <a:rPr lang="en-US" dirty="0" smtClean="0"/>
-              <a:t>Tips </a:t>
-            </a:r>
-            <a:r>
-              <a:rPr lang="en-US" dirty="0" smtClean="0"/>
-              <a:t>for success</a:t>
+              <a:t>Tips for success</a:t>
             </a:r>
             <a:endParaRPr lang="en-US" dirty="0"/>
           </a:p>
@@ -11682,7 +11698,6 @@
                 <a:rPr lang="en-US" dirty="0"/>
                 <a:t>2</a:t>
               </a:r>
-              <a:endParaRPr lang="en-US" dirty="0"/>
             </a:p>
           </p:txBody>
         </p:sp>
@@ -12730,7 +12745,6 @@
                 <a:rPr lang="en-US" dirty="0"/>
                 <a:t>2</a:t>
               </a:r>
-              <a:endParaRPr lang="en-US" dirty="0"/>
             </a:p>
           </p:txBody>
         </p:sp>
@@ -13611,7 +13625,6 @@
                 <a:rPr lang="en-US" dirty="0"/>
                 <a:t>2</a:t>
               </a:r>
-              <a:endParaRPr lang="en-US" dirty="0"/>
             </a:p>
           </p:txBody>
         </p:sp>

</xml_diff>